<commit_message>
change img placement on local storage slides
</commit_message>
<xml_diff>
--- a/CIT261/05 Local Storage/Local Storage.pptx
+++ b/CIT261/05 Local Storage/Local Storage.pptx
@@ -16180,8 +16180,8 @@
         </p:blipFill>
         <p:spPr>
           <a:xfrm>
-            <a:off x="903514" y="2133599"/>
-            <a:ext cx="10210434" cy="2547257"/>
+            <a:off x="4834660" y="2349925"/>
+            <a:ext cx="6279288" cy="1566531"/>
           </a:xfrm>
           <a:prstGeom prst="rect">
             <a:avLst/>
@@ -16268,8 +16268,8 @@
         </p:blipFill>
         <p:spPr>
           <a:xfrm>
-            <a:off x="1127667" y="1572322"/>
-            <a:ext cx="9727788" cy="3635298"/>
+            <a:off x="5132852" y="2263438"/>
+            <a:ext cx="5807664" cy="2170338"/>
           </a:xfrm>
           <a:prstGeom prst="rect">
             <a:avLst/>

</xml_diff>